<commit_message>
Add link to array.xml
</commit_message>
<xml_diff>
--- a/LearningAndroidSession2.pptx
+++ b/LearningAndroidSession2.pptx
@@ -6,26 +6,27 @@
   </p:sldMasterIdLst>
   <p:sldIdLst>
     <p:sldId id="256" r:id="rId2"/>
-    <p:sldId id="257" r:id="rId3"/>
-    <p:sldId id="258" r:id="rId4"/>
-    <p:sldId id="259" r:id="rId5"/>
-    <p:sldId id="260" r:id="rId6"/>
-    <p:sldId id="262" r:id="rId7"/>
-    <p:sldId id="261" r:id="rId8"/>
-    <p:sldId id="272" r:id="rId9"/>
-    <p:sldId id="273" r:id="rId10"/>
-    <p:sldId id="263" r:id="rId11"/>
-    <p:sldId id="264" r:id="rId12"/>
-    <p:sldId id="265" r:id="rId13"/>
-    <p:sldId id="274" r:id="rId14"/>
-    <p:sldId id="275" r:id="rId15"/>
-    <p:sldId id="266" r:id="rId16"/>
-    <p:sldId id="267" r:id="rId17"/>
-    <p:sldId id="268" r:id="rId18"/>
-    <p:sldId id="269" r:id="rId19"/>
-    <p:sldId id="270" r:id="rId20"/>
-    <p:sldId id="271" r:id="rId21"/>
-    <p:sldId id="276" r:id="rId22"/>
+    <p:sldId id="277" r:id="rId3"/>
+    <p:sldId id="257" r:id="rId4"/>
+    <p:sldId id="258" r:id="rId5"/>
+    <p:sldId id="259" r:id="rId6"/>
+    <p:sldId id="260" r:id="rId7"/>
+    <p:sldId id="262" r:id="rId8"/>
+    <p:sldId id="261" r:id="rId9"/>
+    <p:sldId id="272" r:id="rId10"/>
+    <p:sldId id="273" r:id="rId11"/>
+    <p:sldId id="263" r:id="rId12"/>
+    <p:sldId id="264" r:id="rId13"/>
+    <p:sldId id="265" r:id="rId14"/>
+    <p:sldId id="274" r:id="rId15"/>
+    <p:sldId id="275" r:id="rId16"/>
+    <p:sldId id="266" r:id="rId17"/>
+    <p:sldId id="267" r:id="rId18"/>
+    <p:sldId id="268" r:id="rId19"/>
+    <p:sldId id="269" r:id="rId20"/>
+    <p:sldId id="270" r:id="rId21"/>
+    <p:sldId id="271" r:id="rId22"/>
+    <p:sldId id="276" r:id="rId23"/>
   </p:sldIdLst>
   <p:sldSz cx="9144000" cy="6858000" type="screen4x3"/>
   <p:notesSz cx="6858000" cy="9144000"/>
@@ -346,7 +347,7 @@
           <a:p>
             <a:fld id="{70FAA508-F0CD-46EA-95FB-26B559A0B5D9}" type="datetimeFigureOut">
               <a:rPr lang="en-US" smtClean="0"/>
-              <a:t>2/13/13</a:t>
+              <a:t>2/14/13</a:t>
             </a:fld>
             <a:endParaRPr lang="en-US"/>
           </a:p>
@@ -667,7 +668,7 @@
           <a:p>
             <a:fld id="{70FAA508-F0CD-46EA-95FB-26B559A0B5D9}" type="datetimeFigureOut">
               <a:rPr lang="en-US" smtClean="0"/>
-              <a:t>2/13/13</a:t>
+              <a:t>2/14/13</a:t>
             </a:fld>
             <a:endParaRPr lang="en-US"/>
           </a:p>
@@ -944,7 +945,7 @@
           <a:p>
             <a:fld id="{70FAA508-F0CD-46EA-95FB-26B559A0B5D9}" type="datetimeFigureOut">
               <a:rPr lang="en-US" smtClean="0"/>
-              <a:t>2/13/13</a:t>
+              <a:t>2/14/13</a:t>
             </a:fld>
             <a:endParaRPr lang="en-US"/>
           </a:p>
@@ -1238,7 +1239,7 @@
           <a:p>
             <a:fld id="{70FAA508-F0CD-46EA-95FB-26B559A0B5D9}" type="datetimeFigureOut">
               <a:rPr lang="en-US" smtClean="0"/>
-              <a:t>2/13/13</a:t>
+              <a:t>2/14/13</a:t>
             </a:fld>
             <a:endParaRPr lang="en-US"/>
           </a:p>
@@ -1567,7 +1568,7 @@
           <a:p>
             <a:fld id="{70FAA508-F0CD-46EA-95FB-26B559A0B5D9}" type="datetimeFigureOut">
               <a:rPr lang="en-US" smtClean="0"/>
-              <a:t>2/13/13</a:t>
+              <a:t>2/14/13</a:t>
             </a:fld>
             <a:endParaRPr lang="en-US"/>
           </a:p>
@@ -1818,7 +1819,7 @@
           <a:p>
             <a:fld id="{70FAA508-F0CD-46EA-95FB-26B559A0B5D9}" type="datetimeFigureOut">
               <a:rPr lang="en-US" smtClean="0"/>
-              <a:t>2/13/13</a:t>
+              <a:t>2/14/13</a:t>
             </a:fld>
             <a:endParaRPr lang="en-US"/>
           </a:p>
@@ -1997,7 +1998,7 @@
           <a:p>
             <a:fld id="{70FAA508-F0CD-46EA-95FB-26B559A0B5D9}" type="datetimeFigureOut">
               <a:rPr lang="en-US" smtClean="0"/>
-              <a:t>2/13/13</a:t>
+              <a:t>2/14/13</a:t>
             </a:fld>
             <a:endParaRPr lang="en-US"/>
           </a:p>
@@ -2166,7 +2167,7 @@
           <a:p>
             <a:fld id="{70FAA508-F0CD-46EA-95FB-26B559A0B5D9}" type="datetimeFigureOut">
               <a:rPr lang="en-US" smtClean="0"/>
-              <a:t>2/13/13</a:t>
+              <a:t>2/14/13</a:t>
             </a:fld>
             <a:endParaRPr lang="en-US"/>
           </a:p>
@@ -2435,7 +2436,7 @@
           <a:p>
             <a:fld id="{70FAA508-F0CD-46EA-95FB-26B559A0B5D9}" type="datetimeFigureOut">
               <a:rPr lang="en-US" smtClean="0"/>
-              <a:t>2/13/13</a:t>
+              <a:t>2/14/13</a:t>
             </a:fld>
             <a:endParaRPr lang="en-US"/>
           </a:p>
@@ -2742,7 +2743,7 @@
           <a:p>
             <a:fld id="{70FAA508-F0CD-46EA-95FB-26B559A0B5D9}" type="datetimeFigureOut">
               <a:rPr lang="en-US" smtClean="0"/>
-              <a:t>2/13/13</a:t>
+              <a:t>2/14/13</a:t>
             </a:fld>
             <a:endParaRPr lang="en-US"/>
           </a:p>
@@ -3034,7 +3035,7 @@
           <a:p>
             <a:fld id="{70FAA508-F0CD-46EA-95FB-26B559A0B5D9}" type="datetimeFigureOut">
               <a:rPr lang="en-US" smtClean="0"/>
-              <a:t>2/13/13</a:t>
+              <a:t>2/14/13</a:t>
             </a:fld>
             <a:endParaRPr lang="en-US"/>
           </a:p>
@@ -3464,7 +3465,7 @@
           <a:p>
             <a:fld id="{70FAA508-F0CD-46EA-95FB-26B559A0B5D9}" type="datetimeFigureOut">
               <a:rPr lang="en-US" smtClean="0"/>
-              <a:t>2/13/13</a:t>
+              <a:t>2/14/13</a:t>
             </a:fld>
             <a:endParaRPr lang="en-US"/>
           </a:p>
@@ -3810,7 +3811,7 @@
           <a:p>
             <a:fld id="{70FAA508-F0CD-46EA-95FB-26B559A0B5D9}" type="datetimeFigureOut">
               <a:rPr lang="en-US" smtClean="0"/>
-              <a:t>2/13/13</a:t>
+              <a:t>2/14/13</a:t>
             </a:fld>
             <a:endParaRPr lang="en-US"/>
           </a:p>
@@ -3900,7 +3901,7 @@
           <a:p>
             <a:fld id="{70FAA508-F0CD-46EA-95FB-26B559A0B5D9}" type="datetimeFigureOut">
               <a:rPr lang="en-US" smtClean="0"/>
-              <a:t>2/13/13</a:t>
+              <a:t>2/14/13</a:t>
             </a:fld>
             <a:endParaRPr lang="en-US"/>
           </a:p>
@@ -4237,7 +4238,7 @@
           <a:p>
             <a:fld id="{70FAA508-F0CD-46EA-95FB-26B559A0B5D9}" type="datetimeFigureOut">
               <a:rPr lang="en-US" smtClean="0"/>
-              <a:t>2/13/13</a:t>
+              <a:t>2/14/13</a:t>
             </a:fld>
             <a:endParaRPr lang="en-US"/>
           </a:p>
@@ -4449,7 +4450,7 @@
           <a:p>
             <a:fld id="{70FAA508-F0CD-46EA-95FB-26B559A0B5D9}" type="datetimeFigureOut">
               <a:rPr lang="en-US" smtClean="0"/>
-              <a:t>2/13/13</a:t>
+              <a:t>2/14/13</a:t>
             </a:fld>
             <a:endParaRPr lang="en-US"/>
           </a:p>
@@ -5087,7 +5088,7 @@
           <a:p>
             <a:r>
               <a:rPr lang="en-US" dirty="0" err="1" smtClean="0"/>
-              <a:t>ListView</a:t>
+              <a:t>RelativeLayout</a:t>
             </a:r>
             <a:endParaRPr lang="en-US" dirty="0"/>
           </a:p>
@@ -5109,22 +5110,8 @@
           <a:lstStyle/>
           <a:p>
             <a:r>
-              <a:rPr lang="en-US" dirty="0" err="1" smtClean="0"/>
-              <a:t>ListView</a:t>
-            </a:r>
-            <a:r>
-              <a:rPr lang="en-US" dirty="0" smtClean="0"/>
-              <a:t> is one of the most useful, yet most complex, classes in the SDK</a:t>
-            </a:r>
-          </a:p>
-          <a:p>
-            <a:r>
-              <a:rPr lang="en-US" dirty="0" smtClean="0"/>
-              <a:t>Nearly every Android application uses a </a:t>
-            </a:r>
-            <a:r>
-              <a:rPr lang="en-US" dirty="0" err="1" smtClean="0"/>
-              <a:t>ListView</a:t>
+              <a:rPr lang="en-US" dirty="0" smtClean="0"/>
+              <a:t>Demo</a:t>
             </a:r>
             <a:endParaRPr lang="en-US" dirty="0"/>
           </a:p>
@@ -5133,7 +5120,7 @@
     </p:spTree>
     <p:extLst>
       <p:ext uri="{BB962C8B-B14F-4D97-AF65-F5344CB8AC3E}">
-        <p14:creationId xmlns:p14="http://schemas.microsoft.com/office/powerpoint/2010/main" val="1574945750"/>
+        <p14:creationId xmlns:p14="http://schemas.microsoft.com/office/powerpoint/2010/main" val="2618790163"/>
       </p:ext>
     </p:extLst>
   </p:cSld>
@@ -5176,53 +5163,45 @@
           <a:lstStyle/>
           <a:p>
             <a:r>
-              <a:rPr lang="en-US" dirty="0" smtClean="0"/>
-              <a:t>Adapters</a:t>
-            </a:r>
-            <a:endParaRPr lang="en-US" dirty="0"/>
-          </a:p>
-        </p:txBody>
-      </p:sp>
-      <p:sp>
-        <p:nvSpPr>
-          <p:cNvPr id="3" name="Content Placeholder 2"/>
-          <p:cNvSpPr>
-            <a:spLocks noGrp="1"/>
-          </p:cNvSpPr>
-          <p:nvPr>
-            <p:ph idx="1"/>
-          </p:nvPr>
-        </p:nvSpPr>
-        <p:spPr/>
-        <p:txBody>
-          <a:bodyPr/>
-          <a:lstStyle/>
-          <a:p>
-            <a:r>
-              <a:rPr lang="en-US" dirty="0" smtClean="0"/>
-              <a:t>Adapters hold the data that backs a </a:t>
-            </a:r>
-            <a:r>
               <a:rPr lang="en-US" dirty="0" err="1" smtClean="0"/>
               <a:t>ListView</a:t>
             </a:r>
-            <a:r>
-              <a:rPr lang="en-US" dirty="0" smtClean="0"/>
-              <a:t> and serves the </a:t>
-            </a:r>
+            <a:endParaRPr lang="en-US" dirty="0"/>
+          </a:p>
+        </p:txBody>
+      </p:sp>
+      <p:sp>
+        <p:nvSpPr>
+          <p:cNvPr id="3" name="Content Placeholder 2"/>
+          <p:cNvSpPr>
+            <a:spLocks noGrp="1"/>
+          </p:cNvSpPr>
+          <p:nvPr>
+            <p:ph idx="1"/>
+          </p:nvPr>
+        </p:nvSpPr>
+        <p:spPr/>
+        <p:txBody>
+          <a:bodyPr/>
+          <a:lstStyle/>
+          <a:p>
             <a:r>
               <a:rPr lang="en-US" dirty="0" err="1" smtClean="0"/>
               <a:t>ListView</a:t>
             </a:r>
             <a:r>
               <a:rPr lang="en-US" dirty="0" smtClean="0"/>
-              <a:t> the correct Views to display in its rows</a:t>
-            </a:r>
-          </a:p>
-          <a:p>
-            <a:r>
-              <a:rPr lang="en-US" dirty="0" smtClean="0"/>
-              <a:t>Data can be Arrays, Cursors, just about any collection</a:t>
+              <a:t> is one of the most useful, yet most complex, classes in the SDK</a:t>
+            </a:r>
+          </a:p>
+          <a:p>
+            <a:r>
+              <a:rPr lang="en-US" dirty="0" smtClean="0"/>
+              <a:t>Nearly every Android application uses a </a:t>
+            </a:r>
+            <a:r>
+              <a:rPr lang="en-US" dirty="0" err="1" smtClean="0"/>
+              <a:t>ListView</a:t>
             </a:r>
             <a:endParaRPr lang="en-US" dirty="0"/>
           </a:p>
@@ -5231,7 +5210,7 @@
     </p:spTree>
     <p:extLst>
       <p:ext uri="{BB962C8B-B14F-4D97-AF65-F5344CB8AC3E}">
-        <p14:creationId xmlns:p14="http://schemas.microsoft.com/office/powerpoint/2010/main" val="3066346891"/>
+        <p14:creationId xmlns:p14="http://schemas.microsoft.com/office/powerpoint/2010/main" val="1574945750"/>
       </p:ext>
     </p:extLst>
   </p:cSld>
@@ -5274,35 +5253,53 @@
           <a:lstStyle/>
           <a:p>
             <a:r>
+              <a:rPr lang="en-US" dirty="0" smtClean="0"/>
+              <a:t>Adapters</a:t>
+            </a:r>
+            <a:endParaRPr lang="en-US" dirty="0"/>
+          </a:p>
+        </p:txBody>
+      </p:sp>
+      <p:sp>
+        <p:nvSpPr>
+          <p:cNvPr id="3" name="Content Placeholder 2"/>
+          <p:cNvSpPr>
+            <a:spLocks noGrp="1"/>
+          </p:cNvSpPr>
+          <p:nvPr>
+            <p:ph idx="1"/>
+          </p:nvPr>
+        </p:nvSpPr>
+        <p:spPr/>
+        <p:txBody>
+          <a:bodyPr/>
+          <a:lstStyle/>
+          <a:p>
+            <a:r>
+              <a:rPr lang="en-US" dirty="0" smtClean="0"/>
+              <a:t>Adapters hold the data that backs a </a:t>
+            </a:r>
+            <a:r>
               <a:rPr lang="en-US" dirty="0" err="1" smtClean="0"/>
               <a:t>ListView</a:t>
             </a:r>
             <a:r>
               <a:rPr lang="en-US" dirty="0" smtClean="0"/>
-              <a:t> Working With Adapter</a:t>
-            </a:r>
-            <a:endParaRPr lang="en-US" dirty="0"/>
-          </a:p>
-        </p:txBody>
-      </p:sp>
-      <p:sp>
-        <p:nvSpPr>
-          <p:cNvPr id="6" name="Content Placeholder 5"/>
-          <p:cNvSpPr>
-            <a:spLocks noGrp="1"/>
-          </p:cNvSpPr>
-          <p:nvPr>
-            <p:ph idx="1"/>
-          </p:nvPr>
-        </p:nvSpPr>
-        <p:spPr/>
-        <p:txBody>
-          <a:bodyPr/>
-          <a:lstStyle/>
-          <a:p>
-            <a:r>
-              <a:rPr lang="en-US" dirty="0" smtClean="0"/>
-              <a:t>Whiteboard demo</a:t>
+              <a:t> and serves the </a:t>
+            </a:r>
+            <a:r>
+              <a:rPr lang="en-US" dirty="0" err="1" smtClean="0"/>
+              <a:t>ListView</a:t>
+            </a:r>
+            <a:r>
+              <a:rPr lang="en-US" dirty="0" smtClean="0"/>
+              <a:t> the correct Views to display in its rows</a:t>
+            </a:r>
+          </a:p>
+          <a:p>
+            <a:r>
+              <a:rPr lang="en-US" dirty="0" smtClean="0"/>
+              <a:t>Data can be Arrays, Cursors, just about any collection</a:t>
             </a:r>
             <a:endParaRPr lang="en-US" dirty="0"/>
           </a:p>
@@ -5311,7 +5308,7 @@
     </p:spTree>
     <p:extLst>
       <p:ext uri="{BB962C8B-B14F-4D97-AF65-F5344CB8AC3E}">
-        <p14:creationId xmlns:p14="http://schemas.microsoft.com/office/powerpoint/2010/main" val="2040250193"/>
+        <p14:creationId xmlns:p14="http://schemas.microsoft.com/office/powerpoint/2010/main" val="3066346891"/>
       </p:ext>
     </p:extLst>
   </p:cSld>
@@ -5355,7 +5352,11 @@
           <a:p>
             <a:r>
               <a:rPr lang="en-US" dirty="0" err="1" smtClean="0"/>
-              <a:t>LayoutInflater</a:t>
+              <a:t>ListView</a:t>
+            </a:r>
+            <a:r>
+              <a:rPr lang="en-US" dirty="0" smtClean="0"/>
+              <a:t> Working With Adapter</a:t>
             </a:r>
             <a:endParaRPr lang="en-US" dirty="0"/>
           </a:p>
@@ -5363,7 +5364,7 @@
       </p:sp>
       <p:sp>
         <p:nvSpPr>
-          <p:cNvPr id="3" name="Content Placeholder 2"/>
+          <p:cNvPr id="6" name="Content Placeholder 5"/>
           <p:cNvSpPr>
             <a:spLocks noGrp="1"/>
           </p:cNvSpPr>
@@ -5378,59 +5379,16 @@
           <a:p>
             <a:r>
               <a:rPr lang="en-US" dirty="0" smtClean="0"/>
-              <a:t>Views can be inflated from xml</a:t>
-            </a:r>
-          </a:p>
-          <a:p>
-            <a:r>
-              <a:rPr lang="en-US" dirty="0" smtClean="0"/>
-              <a:t>Special class to do this: </a:t>
-            </a:r>
-            <a:r>
-              <a:rPr lang="en-US" dirty="0" err="1" smtClean="0"/>
-              <a:t>LayoutInflater</a:t>
-            </a:r>
-            <a:endParaRPr lang="en-US" dirty="0" smtClean="0"/>
-          </a:p>
-          <a:p>
-            <a:r>
-              <a:rPr lang="en-US" dirty="0" smtClean="0"/>
-              <a:t>Same thing as calling new View(Context, </a:t>
-            </a:r>
-            <a:r>
-              <a:rPr lang="en-US" dirty="0" err="1" smtClean="0"/>
-              <a:t>AttributeSet</a:t>
-            </a:r>
-            <a:r>
-              <a:rPr lang="en-US" dirty="0" smtClean="0"/>
-              <a:t>[])</a:t>
-            </a:r>
-          </a:p>
-          <a:p>
-            <a:pPr lvl="1"/>
-            <a:r>
-              <a:rPr lang="en-US" dirty="0" err="1" smtClean="0"/>
-              <a:t>LayoutInflater</a:t>
-            </a:r>
-            <a:r>
-              <a:rPr lang="en-US" dirty="0" smtClean="0"/>
-              <a:t> parses xml to generate </a:t>
-            </a:r>
-            <a:r>
-              <a:rPr lang="en-US" dirty="0" err="1" smtClean="0"/>
-              <a:t>AttributeSet</a:t>
-            </a:r>
-            <a:r>
-              <a:rPr lang="en-US" dirty="0" smtClean="0"/>
-              <a:t>[]</a:t>
-            </a:r>
+              <a:t>Whiteboard demo</a:t>
+            </a:r>
+            <a:endParaRPr lang="en-US" dirty="0"/>
           </a:p>
         </p:txBody>
       </p:sp>
     </p:spTree>
     <p:extLst>
       <p:ext uri="{BB962C8B-B14F-4D97-AF65-F5344CB8AC3E}">
-        <p14:creationId xmlns:p14="http://schemas.microsoft.com/office/powerpoint/2010/main" val="568622111"/>
+        <p14:creationId xmlns:p14="http://schemas.microsoft.com/office/powerpoint/2010/main" val="2040250193"/>
       </p:ext>
     </p:extLst>
   </p:cSld>
@@ -5497,16 +5455,59 @@
           <a:p>
             <a:r>
               <a:rPr lang="en-US" dirty="0" smtClean="0"/>
-              <a:t>Demo</a:t>
-            </a:r>
-            <a:endParaRPr lang="en-US" dirty="0"/>
+              <a:t>Views can be inflated from xml</a:t>
+            </a:r>
+          </a:p>
+          <a:p>
+            <a:r>
+              <a:rPr lang="en-US" dirty="0" smtClean="0"/>
+              <a:t>Special class to do this: </a:t>
+            </a:r>
+            <a:r>
+              <a:rPr lang="en-US" dirty="0" err="1" smtClean="0"/>
+              <a:t>LayoutInflater</a:t>
+            </a:r>
+            <a:endParaRPr lang="en-US" dirty="0" smtClean="0"/>
+          </a:p>
+          <a:p>
+            <a:r>
+              <a:rPr lang="en-US" dirty="0" smtClean="0"/>
+              <a:t>Same thing as calling new View(Context, </a:t>
+            </a:r>
+            <a:r>
+              <a:rPr lang="en-US" dirty="0" err="1" smtClean="0"/>
+              <a:t>AttributeSet</a:t>
+            </a:r>
+            <a:r>
+              <a:rPr lang="en-US" dirty="0" smtClean="0"/>
+              <a:t>[])</a:t>
+            </a:r>
+          </a:p>
+          <a:p>
+            <a:pPr lvl="1"/>
+            <a:r>
+              <a:rPr lang="en-US" dirty="0" err="1" smtClean="0"/>
+              <a:t>LayoutInflater</a:t>
+            </a:r>
+            <a:r>
+              <a:rPr lang="en-US" dirty="0" smtClean="0"/>
+              <a:t> parses xml to generate </a:t>
+            </a:r>
+            <a:r>
+              <a:rPr lang="en-US" dirty="0" err="1" smtClean="0"/>
+              <a:t>AttributeSet</a:t>
+            </a:r>
+            <a:r>
+              <a:rPr lang="en-US" dirty="0" smtClean="0"/>
+              <a:t>[]</a:t>
+            </a:r>
           </a:p>
         </p:txBody>
       </p:sp>
     </p:spTree>
     <p:extLst>
       <p:ext uri="{BB962C8B-B14F-4D97-AF65-F5344CB8AC3E}">
-        <p14:creationId xmlns:p14="http://schemas.microsoft.com/office/powerpoint/2010/main" val="1447465516"/>
+        <p14:creationId xmlns:p14="http://schemas.microsoft.com/office/powerpoint/2010/main" val="568622111"/>
       </p:ext>
     </p:extLst>
   </p:cSld>
@@ -5549,8 +5550,8 @@
           <a:lstStyle/>
           <a:p>
             <a:r>
-              <a:rPr lang="en-US" dirty="0" smtClean="0"/>
-              <a:t>Optimizations</a:t>
+              <a:rPr lang="en-US" dirty="0" err="1" smtClean="0"/>
+              <a:t>LayoutInflater</a:t>
             </a:r>
             <a:endParaRPr lang="en-US" dirty="0"/>
           </a:p>
@@ -5573,31 +5574,7 @@
           <a:p>
             <a:r>
               <a:rPr lang="en-US" dirty="0" smtClean="0"/>
-              <a:t>The secret sauce behind </a:t>
-            </a:r>
-            <a:r>
-              <a:rPr lang="en-US" dirty="0" err="1" smtClean="0"/>
-              <a:t>ListView</a:t>
-            </a:r>
-            <a:r>
-              <a:rPr lang="en-US" dirty="0" smtClean="0"/>
-              <a:t>: Recycler</a:t>
-            </a:r>
-          </a:p>
-          <a:p>
-            <a:r>
-              <a:rPr lang="en-US" dirty="0" err="1" smtClean="0"/>
-              <a:t>ListView</a:t>
-            </a:r>
-            <a:r>
-              <a:rPr lang="en-US" dirty="0" smtClean="0"/>
-              <a:t> only inflates the number of Views needed to fill the screen</a:t>
-            </a:r>
-          </a:p>
-          <a:p>
-            <a:r>
-              <a:rPr lang="en-US" dirty="0" smtClean="0"/>
-              <a:t>When one leaves the top of the screen, it is reused to fill View coming up from the bottom of the screen</a:t>
+              <a:t>Demo</a:t>
             </a:r>
             <a:endParaRPr lang="en-US" dirty="0"/>
           </a:p>
@@ -5606,7 +5583,7 @@
     </p:spTree>
     <p:extLst>
       <p:ext uri="{BB962C8B-B14F-4D97-AF65-F5344CB8AC3E}">
-        <p14:creationId xmlns:p14="http://schemas.microsoft.com/office/powerpoint/2010/main" val="644258902"/>
+        <p14:creationId xmlns:p14="http://schemas.microsoft.com/office/powerpoint/2010/main" val="1447465516"/>
       </p:ext>
     </p:extLst>
   </p:cSld>
@@ -5649,35 +5626,55 @@
           <a:lstStyle/>
           <a:p>
             <a:r>
+              <a:rPr lang="en-US" dirty="0" smtClean="0"/>
+              <a:t>Optimizations</a:t>
+            </a:r>
+            <a:endParaRPr lang="en-US" dirty="0"/>
+          </a:p>
+        </p:txBody>
+      </p:sp>
+      <p:sp>
+        <p:nvSpPr>
+          <p:cNvPr id="3" name="Content Placeholder 2"/>
+          <p:cNvSpPr>
+            <a:spLocks noGrp="1"/>
+          </p:cNvSpPr>
+          <p:nvPr>
+            <p:ph idx="1"/>
+          </p:nvPr>
+        </p:nvSpPr>
+        <p:spPr/>
+        <p:txBody>
+          <a:bodyPr/>
+          <a:lstStyle/>
+          <a:p>
+            <a:r>
+              <a:rPr lang="en-US" dirty="0" smtClean="0"/>
+              <a:t>The secret sauce behind </a:t>
+            </a:r>
+            <a:r>
               <a:rPr lang="en-US" dirty="0" err="1" smtClean="0"/>
               <a:t>ListView</a:t>
             </a:r>
             <a:r>
               <a:rPr lang="en-US" dirty="0" smtClean="0"/>
-              <a:t> View Recycling</a:t>
-            </a:r>
-            <a:endParaRPr lang="en-US" dirty="0"/>
-          </a:p>
-        </p:txBody>
-      </p:sp>
-      <p:sp>
-        <p:nvSpPr>
-          <p:cNvPr id="3" name="Content Placeholder 2"/>
-          <p:cNvSpPr>
-            <a:spLocks noGrp="1"/>
-          </p:cNvSpPr>
-          <p:nvPr>
-            <p:ph idx="1"/>
-          </p:nvPr>
-        </p:nvSpPr>
-        <p:spPr/>
-        <p:txBody>
-          <a:bodyPr/>
-          <a:lstStyle/>
-          <a:p>
-            <a:r>
-              <a:rPr lang="en-US" dirty="0" smtClean="0"/>
-              <a:t>Whiteboard demo</a:t>
+              <a:t>: Recycler</a:t>
+            </a:r>
+          </a:p>
+          <a:p>
+            <a:r>
+              <a:rPr lang="en-US" dirty="0" err="1" smtClean="0"/>
+              <a:t>ListView</a:t>
+            </a:r>
+            <a:r>
+              <a:rPr lang="en-US" dirty="0" smtClean="0"/>
+              <a:t> only inflates the number of Views needed to fill the screen</a:t>
+            </a:r>
+          </a:p>
+          <a:p>
+            <a:r>
+              <a:rPr lang="en-US" dirty="0" smtClean="0"/>
+              <a:t>When one leaves the top of the screen, it is reused to fill View coming up from the bottom of the screen</a:t>
             </a:r>
             <a:endParaRPr lang="en-US" dirty="0"/>
           </a:p>
@@ -5686,7 +5683,7 @@
     </p:spTree>
     <p:extLst>
       <p:ext uri="{BB962C8B-B14F-4D97-AF65-F5344CB8AC3E}">
-        <p14:creationId xmlns:p14="http://schemas.microsoft.com/office/powerpoint/2010/main" val="1838415270"/>
+        <p14:creationId xmlns:p14="http://schemas.microsoft.com/office/powerpoint/2010/main" val="644258902"/>
       </p:ext>
     </p:extLst>
   </p:cSld>
@@ -5729,8 +5726,12 @@
           <a:lstStyle/>
           <a:p>
             <a:r>
-              <a:rPr lang="en-US" dirty="0" smtClean="0"/>
-              <a:t>Optimizations</a:t>
+              <a:rPr lang="en-US" dirty="0" err="1" smtClean="0"/>
+              <a:t>ListView</a:t>
+            </a:r>
+            <a:r>
+              <a:rPr lang="en-US" dirty="0" smtClean="0"/>
+              <a:t> View Recycling</a:t>
             </a:r>
             <a:endParaRPr lang="en-US" dirty="0"/>
           </a:p>
@@ -5752,31 +5753,8 @@
           <a:lstStyle/>
           <a:p>
             <a:r>
-              <a:rPr lang="en-US" dirty="0" err="1" smtClean="0"/>
-              <a:t>hasStableIds</a:t>
-            </a:r>
-            <a:r>
-              <a:rPr lang="en-US" dirty="0" smtClean="0"/>
-              <a:t>() – Google engineers recommend </a:t>
-            </a:r>
-            <a:br>
-              <a:rPr lang="en-US" dirty="0" smtClean="0"/>
-            </a:br>
-            <a:r>
-              <a:rPr lang="en-US" dirty="0" smtClean="0"/>
-              <a:t>returning true for optimization</a:t>
-            </a:r>
-          </a:p>
-          <a:p>
-            <a:r>
-              <a:rPr lang="en-US" dirty="0" smtClean="0"/>
-              <a:t>Keep around Views we will need to manipulate each time a View is requested</a:t>
-            </a:r>
-          </a:p>
-          <a:p>
-            <a:r>
-              <a:rPr lang="en-US" dirty="0" smtClean="0"/>
-              <a:t>How?</a:t>
+              <a:rPr lang="en-US" dirty="0" smtClean="0"/>
+              <a:t>Whiteboard demo</a:t>
             </a:r>
             <a:endParaRPr lang="en-US" dirty="0"/>
           </a:p>
@@ -5785,7 +5763,7 @@
     </p:spTree>
     <p:extLst>
       <p:ext uri="{BB962C8B-B14F-4D97-AF65-F5344CB8AC3E}">
-        <p14:creationId xmlns:p14="http://schemas.microsoft.com/office/powerpoint/2010/main" val="4071635862"/>
+        <p14:creationId xmlns:p14="http://schemas.microsoft.com/office/powerpoint/2010/main" val="1838415270"/>
       </p:ext>
     </p:extLst>
   </p:cSld>
@@ -5828,72 +5806,63 @@
           <a:lstStyle/>
           <a:p>
             <a:r>
+              <a:rPr lang="en-US" dirty="0" smtClean="0"/>
+              <a:t>Optimizations</a:t>
+            </a:r>
+            <a:endParaRPr lang="en-US" dirty="0"/>
+          </a:p>
+        </p:txBody>
+      </p:sp>
+      <p:sp>
+        <p:nvSpPr>
+          <p:cNvPr id="3" name="Content Placeholder 2"/>
+          <p:cNvSpPr>
+            <a:spLocks noGrp="1"/>
+          </p:cNvSpPr>
+          <p:nvPr>
+            <p:ph idx="1"/>
+          </p:nvPr>
+        </p:nvSpPr>
+        <p:spPr/>
+        <p:txBody>
+          <a:bodyPr/>
+          <a:lstStyle/>
+          <a:p>
+            <a:r>
               <a:rPr lang="en-US" dirty="0" err="1" smtClean="0"/>
-              <a:t>ViewHolder</a:t>
-            </a:r>
-            <a:r>
-              <a:rPr lang="en-US" dirty="0" smtClean="0"/>
-              <a:t> Pattern</a:t>
+              <a:t>hasStableIds</a:t>
+            </a:r>
+            <a:r>
+              <a:rPr lang="en-US" dirty="0" smtClean="0"/>
+              <a:t>() – Google engineers recommend </a:t>
+            </a:r>
+            <a:br>
+              <a:rPr lang="en-US" dirty="0" smtClean="0"/>
+            </a:br>
+            <a:r>
+              <a:rPr lang="en-US" dirty="0" smtClean="0"/>
+              <a:t>returning true for optimization</a:t>
+            </a:r>
+          </a:p>
+          <a:p>
+            <a:r>
+              <a:rPr lang="en-US" dirty="0" smtClean="0"/>
+              <a:t>Keep around Views we will need to manipulate each time a View is requested</a:t>
+            </a:r>
+          </a:p>
+          <a:p>
+            <a:r>
+              <a:rPr lang="en-US" dirty="0" smtClean="0"/>
+              <a:t>How?</a:t>
             </a:r>
             <a:endParaRPr lang="en-US" dirty="0"/>
-          </a:p>
-        </p:txBody>
-      </p:sp>
-      <p:sp>
-        <p:nvSpPr>
-          <p:cNvPr id="3" name="Content Placeholder 2"/>
-          <p:cNvSpPr>
-            <a:spLocks noGrp="1"/>
-          </p:cNvSpPr>
-          <p:nvPr>
-            <p:ph idx="1"/>
-          </p:nvPr>
-        </p:nvSpPr>
-        <p:spPr/>
-        <p:txBody>
-          <a:bodyPr/>
-          <a:lstStyle/>
-          <a:p>
-            <a:r>
-              <a:rPr lang="en-US" dirty="0" smtClean="0"/>
-              <a:t>Create static inner class called </a:t>
-            </a:r>
-            <a:r>
-              <a:rPr lang="en-US" dirty="0" err="1" smtClean="0"/>
-              <a:t>ViewHolder</a:t>
-            </a:r>
-            <a:endParaRPr lang="en-US" dirty="0" smtClean="0"/>
-          </a:p>
-          <a:p>
-            <a:r>
-              <a:rPr lang="en-US" dirty="0" err="1" smtClean="0"/>
-              <a:t>ViewHolder</a:t>
-            </a:r>
-            <a:r>
-              <a:rPr lang="en-US" dirty="0" smtClean="0"/>
-              <a:t> fields are just the Views we need to manipulate</a:t>
-            </a:r>
-          </a:p>
-          <a:p>
-            <a:r>
-              <a:rPr lang="en-US" dirty="0" smtClean="0"/>
-              <a:t>How can we associate </a:t>
-            </a:r>
-            <a:r>
-              <a:rPr lang="en-US" dirty="0" err="1" smtClean="0"/>
-              <a:t>ViewHolder</a:t>
-            </a:r>
-            <a:r>
-              <a:rPr lang="en-US" dirty="0" smtClean="0"/>
-              <a:t> with View?</a:t>
-            </a:r>
           </a:p>
         </p:txBody>
       </p:sp>
     </p:spTree>
     <p:extLst>
       <p:ext uri="{BB962C8B-B14F-4D97-AF65-F5344CB8AC3E}">
-        <p14:creationId xmlns:p14="http://schemas.microsoft.com/office/powerpoint/2010/main" val="2441723678"/>
+        <p14:creationId xmlns:p14="http://schemas.microsoft.com/office/powerpoint/2010/main" val="4071635862"/>
       </p:ext>
     </p:extLst>
   </p:cSld>
@@ -5936,67 +5905,64 @@
           <a:lstStyle/>
           <a:p>
             <a:r>
-              <a:rPr lang="en-US" dirty="0" smtClean="0"/>
-              <a:t>Tags</a:t>
-            </a:r>
-            <a:endParaRPr lang="en-US" dirty="0"/>
-          </a:p>
-        </p:txBody>
-      </p:sp>
-      <p:sp>
-        <p:nvSpPr>
-          <p:cNvPr id="3" name="Content Placeholder 2"/>
-          <p:cNvSpPr>
-            <a:spLocks noGrp="1"/>
-          </p:cNvSpPr>
-          <p:nvPr>
-            <p:ph idx="1"/>
-          </p:nvPr>
-        </p:nvSpPr>
-        <p:spPr/>
-        <p:txBody>
-          <a:bodyPr/>
-          <a:lstStyle/>
-          <a:p>
-            <a:r>
-              <a:rPr lang="en-US" dirty="0" smtClean="0"/>
-              <a:t>A View can be given an Object as its Tag</a:t>
-            </a:r>
-          </a:p>
-          <a:p>
-            <a:r>
-              <a:rPr lang="en-US" dirty="0" smtClean="0"/>
-              <a:t>Use </a:t>
-            </a:r>
-            <a:r>
-              <a:rPr lang="en-US" dirty="0" err="1" smtClean="0"/>
-              <a:t>getTag</a:t>
-            </a:r>
-            <a:r>
-              <a:rPr lang="en-US" dirty="0" smtClean="0"/>
-              <a:t>() and </a:t>
-            </a:r>
-            <a:r>
-              <a:rPr lang="en-US" dirty="0" err="1" smtClean="0"/>
-              <a:t>setTag</a:t>
-            </a:r>
-            <a:r>
-              <a:rPr lang="en-US" dirty="0" smtClean="0"/>
-              <a:t>()</a:t>
-            </a:r>
-          </a:p>
-          <a:p>
-            <a:r>
-              <a:rPr lang="en-US" dirty="0" smtClean="0"/>
-              <a:t>If we set the </a:t>
-            </a:r>
-            <a:r>
               <a:rPr lang="en-US" dirty="0" err="1" smtClean="0"/>
               <a:t>ViewHolder</a:t>
             </a:r>
             <a:r>
               <a:rPr lang="en-US" dirty="0" smtClean="0"/>
-              <a:t> to the View’s Tag, we can always access it</a:t>
+              <a:t> Pattern</a:t>
+            </a:r>
+            <a:endParaRPr lang="en-US" dirty="0"/>
+          </a:p>
+        </p:txBody>
+      </p:sp>
+      <p:sp>
+        <p:nvSpPr>
+          <p:cNvPr id="3" name="Content Placeholder 2"/>
+          <p:cNvSpPr>
+            <a:spLocks noGrp="1"/>
+          </p:cNvSpPr>
+          <p:nvPr>
+            <p:ph idx="1"/>
+          </p:nvPr>
+        </p:nvSpPr>
+        <p:spPr/>
+        <p:txBody>
+          <a:bodyPr/>
+          <a:lstStyle/>
+          <a:p>
+            <a:r>
+              <a:rPr lang="en-US" dirty="0" smtClean="0"/>
+              <a:t>Create static inner class called </a:t>
+            </a:r>
+            <a:r>
+              <a:rPr lang="en-US" dirty="0" err="1" smtClean="0"/>
+              <a:t>ViewHolder</a:t>
+            </a:r>
+            <a:endParaRPr lang="en-US" dirty="0" smtClean="0"/>
+          </a:p>
+          <a:p>
+            <a:r>
+              <a:rPr lang="en-US" dirty="0" err="1" smtClean="0"/>
+              <a:t>ViewHolder</a:t>
+            </a:r>
+            <a:r>
+              <a:rPr lang="en-US" dirty="0" smtClean="0"/>
+              <a:t> fields are just the Views we need to manipulate</a:t>
+            </a:r>
+          </a:p>
+          <a:p>
+            <a:r>
+              <a:rPr lang="en-US" dirty="0" smtClean="0"/>
+              <a:t>How can we associate </a:t>
+            </a:r>
+            <a:r>
+              <a:rPr lang="en-US" dirty="0" err="1" smtClean="0"/>
+              <a:t>ViewHolder</a:t>
+            </a:r>
+            <a:r>
+              <a:rPr lang="en-US" dirty="0" smtClean="0"/>
+              <a:t> with View?</a:t>
             </a:r>
           </a:p>
         </p:txBody>
@@ -6004,7 +5970,7 @@
     </p:spTree>
     <p:extLst>
       <p:ext uri="{BB962C8B-B14F-4D97-AF65-F5344CB8AC3E}">
-        <p14:creationId xmlns:p14="http://schemas.microsoft.com/office/powerpoint/2010/main" val="487733910"/>
+        <p14:creationId xmlns:p14="http://schemas.microsoft.com/office/powerpoint/2010/main" val="2441723678"/>
       </p:ext>
     </p:extLst>
   </p:cSld>
@@ -6043,13 +6009,30 @@
         </p:nvSpPr>
         <p:spPr/>
         <p:txBody>
-          <a:bodyPr/>
-          <a:lstStyle/>
-          <a:p>
-            <a:r>
-              <a:rPr lang="en-US" dirty="0" smtClean="0"/>
-              <a:t>Listeners</a:t>
-            </a:r>
+          <a:bodyPr>
+            <a:normAutofit fontScale="90000"/>
+          </a:bodyPr>
+          <a:lstStyle/>
+          <a:p>
+            <a:r>
+              <a:rPr lang="cs-CZ" dirty="0"/>
+              <a:t>https://</a:t>
+            </a:r>
+            <a:r>
+              <a:rPr lang="cs-CZ" dirty="0" err="1"/>
+              <a:t>copy.com</a:t>
+            </a:r>
+            <a:r>
+              <a:rPr lang="cs-CZ" dirty="0"/>
+              <a:t>/B30dOMh2Cc7Q</a:t>
+            </a:r>
+            <a:r>
+              <a:rPr lang="en-US" dirty="0"/>
+              <a:t/>
+            </a:r>
+            <a:br>
+              <a:rPr lang="en-US" dirty="0"/>
+            </a:br>
             <a:endParaRPr lang="en-US" dirty="0"/>
           </a:p>
         </p:txBody>
@@ -6071,24 +6054,15 @@
           <a:p>
             <a:r>
               <a:rPr lang="en-US" dirty="0" smtClean="0"/>
-              <a:t>Quick </a:t>
-            </a:r>
-            <a:r>
-              <a:rPr lang="en-US" dirty="0" err="1" smtClean="0"/>
-              <a:t>suppliment</a:t>
-            </a:r>
-            <a:r>
-              <a:rPr lang="en-US" dirty="0" smtClean="0"/>
-              <a:t> to last week’s discussion on listeners</a:t>
-            </a:r>
-            <a:endParaRPr lang="en-US" dirty="0"/>
+              <a:t>Download this file if you want to follow along with the demo app</a:t>
+            </a:r>
           </a:p>
         </p:txBody>
       </p:sp>
     </p:spTree>
     <p:extLst>
       <p:ext uri="{BB962C8B-B14F-4D97-AF65-F5344CB8AC3E}">
-        <p14:creationId xmlns:p14="http://schemas.microsoft.com/office/powerpoint/2010/main" val="3646499578"/>
+        <p14:creationId xmlns:p14="http://schemas.microsoft.com/office/powerpoint/2010/main" val="2015877051"/>
       </p:ext>
     </p:extLst>
   </p:cSld>
@@ -6132,6 +6106,117 @@
           <a:p>
             <a:r>
               <a:rPr lang="en-US" dirty="0" smtClean="0"/>
+              <a:t>Tags</a:t>
+            </a:r>
+            <a:endParaRPr lang="en-US" dirty="0"/>
+          </a:p>
+        </p:txBody>
+      </p:sp>
+      <p:sp>
+        <p:nvSpPr>
+          <p:cNvPr id="3" name="Content Placeholder 2"/>
+          <p:cNvSpPr>
+            <a:spLocks noGrp="1"/>
+          </p:cNvSpPr>
+          <p:nvPr>
+            <p:ph idx="1"/>
+          </p:nvPr>
+        </p:nvSpPr>
+        <p:spPr/>
+        <p:txBody>
+          <a:bodyPr/>
+          <a:lstStyle/>
+          <a:p>
+            <a:r>
+              <a:rPr lang="en-US" dirty="0" smtClean="0"/>
+              <a:t>A View can be given an Object as its Tag</a:t>
+            </a:r>
+          </a:p>
+          <a:p>
+            <a:r>
+              <a:rPr lang="en-US" dirty="0" smtClean="0"/>
+              <a:t>Use </a:t>
+            </a:r>
+            <a:r>
+              <a:rPr lang="en-US" dirty="0" err="1" smtClean="0"/>
+              <a:t>getTag</a:t>
+            </a:r>
+            <a:r>
+              <a:rPr lang="en-US" dirty="0" smtClean="0"/>
+              <a:t>() and </a:t>
+            </a:r>
+            <a:r>
+              <a:rPr lang="en-US" dirty="0" err="1" smtClean="0"/>
+              <a:t>setTag</a:t>
+            </a:r>
+            <a:r>
+              <a:rPr lang="en-US" dirty="0" smtClean="0"/>
+              <a:t>()</a:t>
+            </a:r>
+          </a:p>
+          <a:p>
+            <a:r>
+              <a:rPr lang="en-US" dirty="0" smtClean="0"/>
+              <a:t>If we set the </a:t>
+            </a:r>
+            <a:r>
+              <a:rPr lang="en-US" dirty="0" err="1" smtClean="0"/>
+              <a:t>ViewHolder</a:t>
+            </a:r>
+            <a:r>
+              <a:rPr lang="en-US" dirty="0" smtClean="0"/>
+              <a:t> to the View’s Tag, we can always access it</a:t>
+            </a:r>
+          </a:p>
+        </p:txBody>
+      </p:sp>
+    </p:spTree>
+    <p:extLst>
+      <p:ext uri="{BB962C8B-B14F-4D97-AF65-F5344CB8AC3E}">
+        <p14:creationId xmlns:p14="http://schemas.microsoft.com/office/powerpoint/2010/main" val="487733910"/>
+      </p:ext>
+    </p:extLst>
+  </p:cSld>
+  <p:clrMapOvr>
+    <a:masterClrMapping/>
+  </p:clrMapOvr>
+</p:sld>
+</file>
+
+<file path=ppt/slides/slide21.xml><?xml version="1.0" encoding="utf-8"?>
+<p:sld xmlns:a="http://schemas.openxmlformats.org/drawingml/2006/main" xmlns:r="http://schemas.openxmlformats.org/officeDocument/2006/relationships" xmlns:p="http://schemas.openxmlformats.org/presentationml/2006/main">
+  <p:cSld>
+    <p:spTree>
+      <p:nvGrpSpPr>
+        <p:cNvPr id="1" name=""/>
+        <p:cNvGrpSpPr/>
+        <p:nvPr/>
+      </p:nvGrpSpPr>
+      <p:grpSpPr>
+        <a:xfrm>
+          <a:off x="0" y="0"/>
+          <a:ext cx="0" cy="0"/>
+          <a:chOff x="0" y="0"/>
+          <a:chExt cx="0" cy="0"/>
+        </a:xfrm>
+      </p:grpSpPr>
+      <p:sp>
+        <p:nvSpPr>
+          <p:cNvPr id="2" name="Title 1"/>
+          <p:cNvSpPr>
+            <a:spLocks noGrp="1"/>
+          </p:cNvSpPr>
+          <p:nvPr>
+            <p:ph type="title"/>
+          </p:nvPr>
+        </p:nvSpPr>
+        <p:spPr/>
+        <p:txBody>
+          <a:bodyPr/>
+          <a:lstStyle/>
+          <a:p>
+            <a:r>
+              <a:rPr lang="en-US" dirty="0" smtClean="0"/>
               <a:t>Best </a:t>
             </a:r>
             <a:r>
@@ -6182,7 +6267,7 @@
 </p:sld>
 </file>
 
-<file path=ppt/slides/slide21.xml><?xml version="1.0" encoding="utf-8"?>
+<file path=ppt/slides/slide22.xml><?xml version="1.0" encoding="utf-8"?>
 <p:sld xmlns:a="http://schemas.openxmlformats.org/drawingml/2006/main" xmlns:r="http://schemas.openxmlformats.org/officeDocument/2006/relationships" xmlns:p="http://schemas.openxmlformats.org/presentationml/2006/main">
   <p:cSld>
     <p:spTree>
@@ -6292,7 +6377,7 @@
           <a:p>
             <a:r>
               <a:rPr lang="en-US" dirty="0" smtClean="0"/>
-              <a:t>Switching Between Activities</a:t>
+              <a:t>Listeners</a:t>
             </a:r>
             <a:endParaRPr lang="en-US" dirty="0"/>
           </a:p>
@@ -6315,51 +6400,24 @@
           <a:p>
             <a:r>
               <a:rPr lang="en-US" dirty="0" smtClean="0"/>
-              <a:t>Activities are started by sending Intent objects to the system</a:t>
-            </a:r>
-          </a:p>
-          <a:p>
-            <a:r>
-              <a:rPr lang="en-US" dirty="0" smtClean="0"/>
-              <a:t>Example:</a:t>
-            </a:r>
-          </a:p>
-          <a:p>
-            <a:pPr marL="0" indent="0">
-              <a:buNone/>
-            </a:pPr>
-            <a:r>
-              <a:rPr lang="en-US" dirty="0" smtClean="0"/>
-              <a:t>Intent intent = new Intent(this, </a:t>
+              <a:t>Quick </a:t>
             </a:r>
             <a:r>
               <a:rPr lang="en-US" dirty="0" err="1" smtClean="0"/>
-              <a:t>SettingsActivity.class</a:t>
-            </a:r>
-            <a:r>
-              <a:rPr lang="en-US" dirty="0" smtClean="0"/>
-              <a:t>);</a:t>
-            </a:r>
-          </a:p>
-          <a:p>
-            <a:pPr marL="0" indent="0">
-              <a:buNone/>
-            </a:pPr>
-            <a:r>
-              <a:rPr lang="en-US" dirty="0" err="1" smtClean="0"/>
-              <a:t>startActivity</a:t>
-            </a:r>
-            <a:r>
-              <a:rPr lang="en-US" dirty="0" smtClean="0"/>
-              <a:t>(intent);</a:t>
-            </a:r>
+              <a:t>suppliment</a:t>
+            </a:r>
+            <a:r>
+              <a:rPr lang="en-US" dirty="0" smtClean="0"/>
+              <a:t> to last week’s discussion on listeners</a:t>
+            </a:r>
+            <a:endParaRPr lang="en-US" dirty="0"/>
           </a:p>
         </p:txBody>
       </p:sp>
     </p:spTree>
     <p:extLst>
       <p:ext uri="{BB962C8B-B14F-4D97-AF65-F5344CB8AC3E}">
-        <p14:creationId xmlns:p14="http://schemas.microsoft.com/office/powerpoint/2010/main" val="3869678926"/>
+        <p14:creationId xmlns:p14="http://schemas.microsoft.com/office/powerpoint/2010/main" val="3646499578"/>
       </p:ext>
     </p:extLst>
   </p:cSld>
@@ -6403,7 +6461,7 @@
           <a:p>
             <a:r>
               <a:rPr lang="en-US" dirty="0" smtClean="0"/>
-              <a:t>Intents</a:t>
+              <a:t>Switching Between Activities</a:t>
             </a:r>
             <a:endParaRPr lang="en-US" dirty="0"/>
           </a:p>
@@ -6426,19 +6484,22 @@
           <a:p>
             <a:r>
               <a:rPr lang="en-US" dirty="0" smtClean="0"/>
-              <a:t>Intent intent = new Intent(</a:t>
-            </a:r>
-            <a:r>
-              <a:rPr lang="en-US" b="1" dirty="0" smtClean="0">
-                <a:solidFill>
-                  <a:srgbClr val="FF0000"/>
-                </a:solidFill>
-              </a:rPr>
-              <a:t>this</a:t>
-            </a:r>
-            <a:r>
-              <a:rPr lang="en-US" dirty="0" smtClean="0"/>
-              <a:t>, </a:t>
+              <a:t>Activities are started by sending Intent objects to the system</a:t>
+            </a:r>
+          </a:p>
+          <a:p>
+            <a:r>
+              <a:rPr lang="en-US" dirty="0" smtClean="0"/>
+              <a:t>Example:</a:t>
+            </a:r>
+          </a:p>
+          <a:p>
+            <a:pPr marL="0" indent="0">
+              <a:buNone/>
+            </a:pPr>
+            <a:r>
+              <a:rPr lang="en-US" dirty="0" smtClean="0"/>
+              <a:t>Intent intent = new Intent(this, </a:t>
             </a:r>
             <a:r>
               <a:rPr lang="en-US" dirty="0" err="1" smtClean="0"/>
@@ -6450,18 +6511,24 @@
             </a:r>
           </a:p>
           <a:p>
-            <a:r>
-              <a:rPr lang="en-US" dirty="0" smtClean="0"/>
-              <a:t>Tell the system which Context started the Activity</a:t>
-            </a:r>
-            <a:endParaRPr lang="en-US" dirty="0"/>
+            <a:pPr marL="0" indent="0">
+              <a:buNone/>
+            </a:pPr>
+            <a:r>
+              <a:rPr lang="en-US" dirty="0" err="1" smtClean="0"/>
+              <a:t>startActivity</a:t>
+            </a:r>
+            <a:r>
+              <a:rPr lang="en-US" dirty="0" smtClean="0"/>
+              <a:t>(intent);</a:t>
+            </a:r>
           </a:p>
         </p:txBody>
       </p:sp>
     </p:spTree>
     <p:extLst>
       <p:ext uri="{BB962C8B-B14F-4D97-AF65-F5344CB8AC3E}">
-        <p14:creationId xmlns:p14="http://schemas.microsoft.com/office/powerpoint/2010/main" val="1033125532"/>
+        <p14:creationId xmlns:p14="http://schemas.microsoft.com/office/powerpoint/2010/main" val="3869678926"/>
       </p:ext>
     </p:extLst>
   </p:cSld>
@@ -6528,14 +6595,22 @@
           <a:p>
             <a:r>
               <a:rPr lang="en-US" dirty="0" smtClean="0"/>
-              <a:t>Intent intent = new Intent(this, </a:t>
-            </a:r>
-            <a:r>
-              <a:rPr lang="en-US" b="1" dirty="0" err="1" smtClean="0">
+              <a:t>Intent intent = new Intent(</a:t>
+            </a:r>
+            <a:r>
+              <a:rPr lang="en-US" b="1" dirty="0" smtClean="0">
                 <a:solidFill>
                   <a:srgbClr val="FF0000"/>
                 </a:solidFill>
               </a:rPr>
+              <a:t>this</a:t>
+            </a:r>
+            <a:r>
+              <a:rPr lang="en-US" dirty="0" smtClean="0"/>
+              <a:t>, </a:t>
+            </a:r>
+            <a:r>
+              <a:rPr lang="en-US" dirty="0" err="1" smtClean="0"/>
               <a:t>SettingsActivity.class</a:t>
             </a:r>
             <a:r>
@@ -6546,7 +6621,7 @@
           <a:p>
             <a:r>
               <a:rPr lang="en-US" dirty="0" smtClean="0"/>
-              <a:t>Tell the system the class of the Activity we want to start</a:t>
+              <a:t>Tell the system which Context started the Activity</a:t>
             </a:r>
             <a:endParaRPr lang="en-US" dirty="0"/>
           </a:p>
@@ -6555,7 +6630,7 @@
     </p:spTree>
     <p:extLst>
       <p:ext uri="{BB962C8B-B14F-4D97-AF65-F5344CB8AC3E}">
-        <p14:creationId xmlns:p14="http://schemas.microsoft.com/office/powerpoint/2010/main" val="3223579126"/>
+        <p14:creationId xmlns:p14="http://schemas.microsoft.com/office/powerpoint/2010/main" val="1033125532"/>
       </p:ext>
     </p:extLst>
   </p:cSld>
@@ -6599,7 +6674,7 @@
           <a:p>
             <a:r>
               <a:rPr lang="en-US" dirty="0" smtClean="0"/>
-              <a:t>Extras</a:t>
+              <a:t>Intents</a:t>
             </a:r>
             <a:endParaRPr lang="en-US" dirty="0"/>
           </a:p>
@@ -6617,41 +6692,19 @@
         </p:nvSpPr>
         <p:spPr/>
         <p:txBody>
-          <a:bodyPr>
-            <a:normAutofit fontScale="47500" lnSpcReduction="20000"/>
-          </a:bodyPr>
-          <a:lstStyle/>
-          <a:p>
-            <a:r>
-              <a:rPr lang="en-US" dirty="0" smtClean="0"/>
-              <a:t>Use extras to pass arguments to Activities</a:t>
-            </a:r>
-          </a:p>
-          <a:p>
-            <a:r>
-              <a:rPr lang="en-US" dirty="0" smtClean="0"/>
-              <a:t>Example</a:t>
-            </a:r>
-          </a:p>
-          <a:p>
-            <a:pPr marL="0" indent="0">
-              <a:buNone/>
-            </a:pPr>
-            <a:r>
-              <a:rPr lang="en-US" dirty="0" smtClean="0"/>
-              <a:t>// In calling Activity</a:t>
-            </a:r>
-          </a:p>
-          <a:p>
-            <a:pPr marL="0" indent="0">
-              <a:buNone/>
-            </a:pPr>
+          <a:bodyPr/>
+          <a:lstStyle/>
+          <a:p>
             <a:r>
               <a:rPr lang="en-US" dirty="0" smtClean="0"/>
               <a:t>Intent intent = new Intent(this, </a:t>
             </a:r>
             <a:r>
-              <a:rPr lang="en-US" dirty="0" err="1" smtClean="0"/>
+              <a:rPr lang="en-US" b="1" dirty="0" err="1" smtClean="0">
+                <a:solidFill>
+                  <a:srgbClr val="FF0000"/>
+                </a:solidFill>
+              </a:rPr>
               <a:t>SettingsActivity.class</a:t>
             </a:r>
             <a:r>
@@ -6660,99 +6713,9 @@
             </a:r>
           </a:p>
           <a:p>
-            <a:pPr marL="0" indent="0">
-              <a:buNone/>
-            </a:pPr>
-            <a:r>
-              <a:rPr lang="en-US" dirty="0" smtClean="0"/>
-              <a:t> </a:t>
-            </a:r>
-            <a:r>
-              <a:rPr lang="en-US" dirty="0" err="1" smtClean="0"/>
-              <a:t>intent.putExtra</a:t>
-            </a:r>
-            <a:r>
-              <a:rPr lang="en-US" dirty="0" smtClean="0"/>
-              <a:t>(“name”, </a:t>
-            </a:r>
-            <a:r>
-              <a:rPr lang="en-US" dirty="0" err="1" smtClean="0"/>
-              <a:t>mUsername</a:t>
-            </a:r>
-            <a:r>
-              <a:rPr lang="en-US" dirty="0" smtClean="0"/>
-              <a:t>); // String </a:t>
-            </a:r>
-            <a:r>
-              <a:rPr lang="en-US" dirty="0" err="1" smtClean="0"/>
-              <a:t>mUsername</a:t>
-            </a:r>
-            <a:endParaRPr lang="en-US" dirty="0" smtClean="0"/>
-          </a:p>
-          <a:p>
-            <a:pPr marL="0" indent="0">
-              <a:buNone/>
-            </a:pPr>
-            <a:r>
-              <a:rPr lang="en-US" dirty="0" err="1" smtClean="0"/>
-              <a:t>startActivity</a:t>
-            </a:r>
-            <a:r>
-              <a:rPr lang="en-US" dirty="0" smtClean="0"/>
-              <a:t>(intent);</a:t>
-            </a:r>
-          </a:p>
-          <a:p>
-            <a:pPr marL="0" indent="0">
-              <a:buNone/>
-            </a:pPr>
-            <a:r>
-              <a:rPr lang="en-US" dirty="0" smtClean="0"/>
-              <a:t>…</a:t>
-            </a:r>
-            <a:endParaRPr lang="en-US" dirty="0"/>
-          </a:p>
-          <a:p>
-            <a:pPr marL="0" indent="0">
-              <a:buNone/>
-            </a:pPr>
-            <a:r>
-              <a:rPr lang="en-US" dirty="0" smtClean="0"/>
-              <a:t>// In starting Activity</a:t>
-            </a:r>
-          </a:p>
-          <a:p>
-            <a:pPr marL="0" indent="0">
-              <a:buNone/>
-            </a:pPr>
-            <a:r>
-              <a:rPr lang="en-US" dirty="0" smtClean="0"/>
-              <a:t>Intent intent = </a:t>
-            </a:r>
-            <a:r>
-              <a:rPr lang="en-US" dirty="0" err="1" smtClean="0"/>
-              <a:t>getIntent</a:t>
-            </a:r>
-            <a:r>
-              <a:rPr lang="en-US" dirty="0" smtClean="0"/>
-              <a:t>();</a:t>
-            </a:r>
-          </a:p>
-          <a:p>
-            <a:pPr marL="0" indent="0">
-              <a:buNone/>
-            </a:pPr>
-            <a:r>
-              <a:rPr lang="en-US" dirty="0" smtClean="0"/>
-              <a:t>String username = </a:t>
-            </a:r>
-            <a:r>
-              <a:rPr lang="en-US" dirty="0" err="1" smtClean="0"/>
-              <a:t>intent.getStringExtra</a:t>
-            </a:r>
-            <a:r>
-              <a:rPr lang="en-US" dirty="0" smtClean="0"/>
-              <a:t>(“name”);</a:t>
+            <a:r>
+              <a:rPr lang="en-US" dirty="0" smtClean="0"/>
+              <a:t>Tell the system the class of the Activity we want to start</a:t>
             </a:r>
             <a:endParaRPr lang="en-US" dirty="0"/>
           </a:p>
@@ -6761,7 +6724,7 @@
     </p:spTree>
     <p:extLst>
       <p:ext uri="{BB962C8B-B14F-4D97-AF65-F5344CB8AC3E}">
-        <p14:creationId xmlns:p14="http://schemas.microsoft.com/office/powerpoint/2010/main" val="1520275126"/>
+        <p14:creationId xmlns:p14="http://schemas.microsoft.com/office/powerpoint/2010/main" val="3223579126"/>
       </p:ext>
     </p:extLst>
   </p:cSld>
@@ -6805,7 +6768,7 @@
           <a:p>
             <a:r>
               <a:rPr lang="en-US" dirty="0" smtClean="0"/>
-              <a:t>Start Our Demo</a:t>
+              <a:t>Extras</a:t>
             </a:r>
             <a:endParaRPr lang="en-US" dirty="0"/>
           </a:p>
@@ -6823,12 +6786,142 @@
         </p:nvSpPr>
         <p:spPr/>
         <p:txBody>
-          <a:bodyPr/>
-          <a:lstStyle/>
-          <a:p>
-            <a:r>
-              <a:rPr lang="en-US" dirty="0" smtClean="0"/>
-              <a:t>Demo</a:t>
+          <a:bodyPr>
+            <a:normAutofit fontScale="47500" lnSpcReduction="20000"/>
+          </a:bodyPr>
+          <a:lstStyle/>
+          <a:p>
+            <a:r>
+              <a:rPr lang="en-US" dirty="0" smtClean="0"/>
+              <a:t>Use extras to pass arguments to Activities</a:t>
+            </a:r>
+          </a:p>
+          <a:p>
+            <a:r>
+              <a:rPr lang="en-US" dirty="0" smtClean="0"/>
+              <a:t>Example</a:t>
+            </a:r>
+          </a:p>
+          <a:p>
+            <a:pPr marL="0" indent="0">
+              <a:buNone/>
+            </a:pPr>
+            <a:r>
+              <a:rPr lang="en-US" dirty="0" smtClean="0"/>
+              <a:t>// In calling Activity</a:t>
+            </a:r>
+          </a:p>
+          <a:p>
+            <a:pPr marL="0" indent="0">
+              <a:buNone/>
+            </a:pPr>
+            <a:r>
+              <a:rPr lang="en-US" dirty="0" smtClean="0"/>
+              <a:t>Intent intent = new Intent(this, </a:t>
+            </a:r>
+            <a:r>
+              <a:rPr lang="en-US" dirty="0" err="1" smtClean="0"/>
+              <a:t>SettingsActivity.class</a:t>
+            </a:r>
+            <a:r>
+              <a:rPr lang="en-US" dirty="0" smtClean="0"/>
+              <a:t>);</a:t>
+            </a:r>
+          </a:p>
+          <a:p>
+            <a:pPr marL="0" indent="0">
+              <a:buNone/>
+            </a:pPr>
+            <a:r>
+              <a:rPr lang="en-US" dirty="0" smtClean="0"/>
+              <a:t> </a:t>
+            </a:r>
+            <a:r>
+              <a:rPr lang="en-US" dirty="0" err="1" smtClean="0"/>
+              <a:t>intent.putExtra</a:t>
+            </a:r>
+            <a:r>
+              <a:rPr lang="en-US" dirty="0" smtClean="0"/>
+              <a:t>(“name”, </a:t>
+            </a:r>
+            <a:r>
+              <a:rPr lang="en-US" dirty="0" err="1" smtClean="0"/>
+              <a:t>mUsername</a:t>
+            </a:r>
+            <a:r>
+              <a:rPr lang="en-US" dirty="0" smtClean="0"/>
+              <a:t>); // String </a:t>
+            </a:r>
+            <a:r>
+              <a:rPr lang="en-US" dirty="0" err="1" smtClean="0"/>
+              <a:t>mUsername</a:t>
+            </a:r>
+            <a:endParaRPr lang="en-US" dirty="0" smtClean="0"/>
+          </a:p>
+          <a:p>
+            <a:pPr marL="0" indent="0">
+              <a:buNone/>
+            </a:pPr>
+            <a:r>
+              <a:rPr lang="en-US" dirty="0" err="1" smtClean="0"/>
+              <a:t>startActivity</a:t>
+            </a:r>
+            <a:r>
+              <a:rPr lang="en-US" dirty="0" smtClean="0"/>
+              <a:t>(intent);</a:t>
+            </a:r>
+          </a:p>
+          <a:p>
+            <a:pPr marL="0" indent="0">
+              <a:buNone/>
+            </a:pPr>
+            <a:r>
+              <a:rPr lang="en-US" dirty="0" smtClean="0"/>
+              <a:t>…</a:t>
+            </a:r>
+            <a:endParaRPr lang="en-US" dirty="0"/>
+          </a:p>
+          <a:p>
+            <a:pPr marL="0" indent="0">
+              <a:buNone/>
+            </a:pPr>
+            <a:r>
+              <a:rPr lang="en-US" dirty="0" smtClean="0"/>
+              <a:t>// In starting Activity</a:t>
+            </a:r>
+          </a:p>
+          <a:p>
+            <a:pPr marL="0" indent="0">
+              <a:buNone/>
+            </a:pPr>
+            <a:r>
+              <a:rPr lang="en-US" dirty="0" smtClean="0"/>
+              <a:t>Intent intent = </a:t>
+            </a:r>
+            <a:r>
+              <a:rPr lang="en-US" dirty="0" err="1" smtClean="0"/>
+              <a:t>getIntent</a:t>
+            </a:r>
+            <a:r>
+              <a:rPr lang="en-US" dirty="0" smtClean="0"/>
+              <a:t>();</a:t>
+            </a:r>
+          </a:p>
+          <a:p>
+            <a:pPr marL="0" indent="0">
+              <a:buNone/>
+            </a:pPr>
+            <a:r>
+              <a:rPr lang="en-US" dirty="0" smtClean="0"/>
+              <a:t>String username = </a:t>
+            </a:r>
+            <a:r>
+              <a:rPr lang="en-US" dirty="0" err="1" smtClean="0"/>
+              <a:t>intent.getStringExtra</a:t>
+            </a:r>
+            <a:r>
+              <a:rPr lang="en-US" dirty="0" smtClean="0"/>
+              <a:t>(“name”);</a:t>
             </a:r>
             <a:endParaRPr lang="en-US" dirty="0"/>
           </a:p>
@@ -6837,7 +6930,7 @@
     </p:spTree>
     <p:extLst>
       <p:ext uri="{BB962C8B-B14F-4D97-AF65-F5344CB8AC3E}">
-        <p14:creationId xmlns:p14="http://schemas.microsoft.com/office/powerpoint/2010/main" val="592652064"/>
+        <p14:creationId xmlns:p14="http://schemas.microsoft.com/office/powerpoint/2010/main" val="1520275126"/>
       </p:ext>
     </p:extLst>
   </p:cSld>
@@ -6880,8 +6973,8 @@
           <a:lstStyle/>
           <a:p>
             <a:r>
-              <a:rPr lang="en-US" dirty="0" err="1" smtClean="0"/>
-              <a:t>RelativeLayout</a:t>
+              <a:rPr lang="en-US" dirty="0" smtClean="0"/>
+              <a:t>Start Our Demo</a:t>
             </a:r>
             <a:endParaRPr lang="en-US" dirty="0"/>
           </a:p>
@@ -6904,13 +6997,7 @@
           <a:p>
             <a:r>
               <a:rPr lang="en-US" dirty="0" smtClean="0"/>
-              <a:t>Can position children relative to one another or to parent</a:t>
-            </a:r>
-          </a:p>
-          <a:p>
-            <a:r>
-              <a:rPr lang="en-US" dirty="0" smtClean="0"/>
-              <a:t>Use ids to tell children where to position themselves</a:t>
+              <a:t>Demo</a:t>
             </a:r>
             <a:endParaRPr lang="en-US" dirty="0"/>
           </a:p>
@@ -6919,7 +7006,7 @@
     </p:spTree>
     <p:extLst>
       <p:ext uri="{BB962C8B-B14F-4D97-AF65-F5344CB8AC3E}">
-        <p14:creationId xmlns:p14="http://schemas.microsoft.com/office/powerpoint/2010/main" val="1918194014"/>
+        <p14:creationId xmlns:p14="http://schemas.microsoft.com/office/powerpoint/2010/main" val="592652064"/>
       </p:ext>
     </p:extLst>
   </p:cSld>
@@ -6986,7 +7073,13 @@
           <a:p>
             <a:r>
               <a:rPr lang="en-US" dirty="0" smtClean="0"/>
-              <a:t>Demo</a:t>
+              <a:t>Can position children relative to one another or to parent</a:t>
+            </a:r>
+          </a:p>
+          <a:p>
+            <a:r>
+              <a:rPr lang="en-US" dirty="0" smtClean="0"/>
+              <a:t>Use ids to tell children where to position themselves</a:t>
             </a:r>
             <a:endParaRPr lang="en-US" dirty="0"/>
           </a:p>
@@ -6995,7 +7088,7 @@
     </p:spTree>
     <p:extLst>
       <p:ext uri="{BB962C8B-B14F-4D97-AF65-F5344CB8AC3E}">
-        <p14:creationId xmlns:p14="http://schemas.microsoft.com/office/powerpoint/2010/main" val="2618790163"/>
+        <p14:creationId xmlns:p14="http://schemas.microsoft.com/office/powerpoint/2010/main" val="1918194014"/>
       </p:ext>
     </p:extLst>
   </p:cSld>

</xml_diff>